<commit_message>
Fixed the addRepeated field
Joe check it out.  Need to figure out remove
</commit_message>
<xml_diff>
--- a/Documents/ProtoDebuggerPresentation.pptx
+++ b/Documents/ProtoDebuggerPresentation.pptx
@@ -15,8 +15,9 @@
     <p:sldId id="265" r:id="rId9"/>
     <p:sldId id="262" r:id="rId10"/>
     <p:sldId id="264" r:id="rId11"/>
-    <p:sldId id="267" r:id="rId12"/>
-    <p:sldId id="263" r:id="rId13"/>
+    <p:sldId id="269" r:id="rId12"/>
+    <p:sldId id="267" r:id="rId13"/>
+    <p:sldId id="263" r:id="rId14"/>
   </p:sldIdLst>
   <p:sldSz cx="9144000" cy="6858000" type="screen4x3"/>
   <p:notesSz cx="6858000" cy="9144000"/>
@@ -367,7 +368,7 @@
             <a:fld id="{DADD7335-8523-47AF-84EC-C89F81FE965C}" type="datetimeFigureOut">
               <a:rPr lang="en-US" smtClean="0"/>
               <a:pPr/>
-              <a:t>10/23/2012</a:t>
+              <a:t>10/30/2012</a:t>
             </a:fld>
             <a:endParaRPr lang="en-US"/>
           </a:p>
@@ -592,7 +593,7 @@
             <a:fld id="{DADD7335-8523-47AF-84EC-C89F81FE965C}" type="datetimeFigureOut">
               <a:rPr lang="en-US" smtClean="0"/>
               <a:pPr/>
-              <a:t>10/23/2012</a:t>
+              <a:t>10/30/2012</a:t>
             </a:fld>
             <a:endParaRPr lang="en-US"/>
           </a:p>
@@ -874,7 +875,7 @@
             <a:fld id="{DADD7335-8523-47AF-84EC-C89F81FE965C}" type="datetimeFigureOut">
               <a:rPr lang="en-US" smtClean="0"/>
               <a:pPr/>
-              <a:t>10/23/2012</a:t>
+              <a:t>10/30/2012</a:t>
             </a:fld>
             <a:endParaRPr lang="en-US"/>
           </a:p>
@@ -1055,7 +1056,7 @@
             <a:fld id="{DADD7335-8523-47AF-84EC-C89F81FE965C}" type="datetimeFigureOut">
               <a:rPr lang="en-US" smtClean="0"/>
               <a:pPr/>
-              <a:t>10/23/2012</a:t>
+              <a:t>10/30/2012</a:t>
             </a:fld>
             <a:endParaRPr lang="en-US"/>
           </a:p>
@@ -1415,7 +1416,7 @@
             <a:fld id="{DADD7335-8523-47AF-84EC-C89F81FE965C}" type="datetimeFigureOut">
               <a:rPr lang="en-US" smtClean="0"/>
               <a:pPr/>
-              <a:t>10/23/2012</a:t>
+              <a:t>10/30/2012</a:t>
             </a:fld>
             <a:endParaRPr lang="en-US"/>
           </a:p>
@@ -1704,7 +1705,7 @@
             <a:fld id="{DADD7335-8523-47AF-84EC-C89F81FE965C}" type="datetimeFigureOut">
               <a:rPr lang="en-US" smtClean="0"/>
               <a:pPr/>
-              <a:t>10/23/2012</a:t>
+              <a:t>10/30/2012</a:t>
             </a:fld>
             <a:endParaRPr lang="en-US"/>
           </a:p>
@@ -2128,7 +2129,7 @@
             <a:fld id="{DADD7335-8523-47AF-84EC-C89F81FE965C}" type="datetimeFigureOut">
               <a:rPr lang="en-US" smtClean="0"/>
               <a:pPr/>
-              <a:t>10/23/2012</a:t>
+              <a:t>10/30/2012</a:t>
             </a:fld>
             <a:endParaRPr lang="en-US"/>
           </a:p>
@@ -2245,7 +2246,7 @@
             <a:fld id="{DADD7335-8523-47AF-84EC-C89F81FE965C}" type="datetimeFigureOut">
               <a:rPr lang="en-US" smtClean="0"/>
               <a:pPr/>
-              <a:t>10/23/2012</a:t>
+              <a:t>10/30/2012</a:t>
             </a:fld>
             <a:endParaRPr lang="en-US"/>
           </a:p>
@@ -2337,7 +2338,7 @@
             <a:fld id="{DADD7335-8523-47AF-84EC-C89F81FE965C}" type="datetimeFigureOut">
               <a:rPr lang="en-US" smtClean="0"/>
               <a:pPr/>
-              <a:t>10/23/2012</a:t>
+              <a:t>10/30/2012</a:t>
             </a:fld>
             <a:endParaRPr lang="en-US"/>
           </a:p>
@@ -2617,7 +2618,7 @@
             <a:fld id="{DADD7335-8523-47AF-84EC-C89F81FE965C}" type="datetimeFigureOut">
               <a:rPr lang="en-US" smtClean="0"/>
               <a:pPr/>
-              <a:t>10/23/2012</a:t>
+              <a:t>10/30/2012</a:t>
             </a:fld>
             <a:endParaRPr lang="en-US"/>
           </a:p>
@@ -2985,7 +2986,7 @@
             <a:fld id="{DADD7335-8523-47AF-84EC-C89F81FE965C}" type="datetimeFigureOut">
               <a:rPr lang="en-US" smtClean="0"/>
               <a:pPr/>
-              <a:t>10/23/2012</a:t>
+              <a:t>10/30/2012</a:t>
             </a:fld>
             <a:endParaRPr lang="en-US"/>
           </a:p>
@@ -3424,7 +3425,7 @@
             <a:fld id="{DADD7335-8523-47AF-84EC-C89F81FE965C}" type="datetimeFigureOut">
               <a:rPr lang="en-US" smtClean="0"/>
               <a:pPr/>
-              <a:t>10/23/2012</a:t>
+              <a:t>10/30/2012</a:t>
             </a:fld>
             <a:endParaRPr lang="en-US"/>
           </a:p>
@@ -4016,7 +4017,7 @@
           <a:p>
             <a:r>
               <a:rPr lang="en-US" dirty="0" smtClean="0"/>
-              <a:t>References</a:t>
+              <a:t>Lessons Learned</a:t>
             </a:r>
             <a:endParaRPr lang="en-US" dirty="0"/>
           </a:p>
@@ -4037,29 +4038,7 @@
           <a:bodyPr/>
           <a:lstStyle/>
           <a:p>
-            <a:r>
-              <a:rPr lang="en-US" sz="2000" dirty="0" smtClean="0"/>
-              <a:t>"Protocol Buffers." </a:t>
-            </a:r>
-            <a:r>
-              <a:rPr lang="en-US" sz="2000" i="1" dirty="0" smtClean="0"/>
-              <a:t>Google Developers</a:t>
-            </a:r>
-            <a:r>
-              <a:rPr lang="en-US" sz="2000" dirty="0" smtClean="0"/>
-              <a:t>. Google, </a:t>
-            </a:r>
-            <a:r>
-              <a:rPr lang="en-US" sz="2000" dirty="0" err="1" smtClean="0"/>
-              <a:t>n.d</a:t>
-            </a:r>
-            <a:r>
-              <a:rPr lang="en-US" sz="2000" dirty="0" smtClean="0"/>
-              <a:t>. Web. 23 Oct. 2012. &lt;https://developers.google.com/protocol-buffers/&gt;.</a:t>
-            </a:r>
-          </a:p>
-          <a:p>
-            <a:endParaRPr lang="en-US" dirty="0"/>
+            <a:endParaRPr lang="en-US"/>
           </a:p>
         </p:txBody>
       </p:sp>
@@ -4072,6 +4051,95 @@
 </file>
 
 <file path=ppt/slides/slide12.xml><?xml version="1.0" encoding="utf-8"?>
+<p:sld xmlns:a="http://schemas.openxmlformats.org/drawingml/2006/main" xmlns:r="http://schemas.openxmlformats.org/officeDocument/2006/relationships" xmlns:p="http://schemas.openxmlformats.org/presentationml/2006/main">
+  <p:cSld>
+    <p:spTree>
+      <p:nvGrpSpPr>
+        <p:cNvPr id="1" name=""/>
+        <p:cNvGrpSpPr/>
+        <p:nvPr/>
+      </p:nvGrpSpPr>
+      <p:grpSpPr>
+        <a:xfrm>
+          <a:off x="0" y="0"/>
+          <a:ext cx="0" cy="0"/>
+          <a:chOff x="0" y="0"/>
+          <a:chExt cx="0" cy="0"/>
+        </a:xfrm>
+      </p:grpSpPr>
+      <p:sp>
+        <p:nvSpPr>
+          <p:cNvPr id="2" name="Title 1"/>
+          <p:cNvSpPr>
+            <a:spLocks noGrp="1"/>
+          </p:cNvSpPr>
+          <p:nvPr>
+            <p:ph type="title"/>
+          </p:nvPr>
+        </p:nvSpPr>
+        <p:spPr/>
+        <p:txBody>
+          <a:bodyPr/>
+          <a:lstStyle/>
+          <a:p>
+            <a:r>
+              <a:rPr lang="en-US" dirty="0" smtClean="0"/>
+              <a:t>References</a:t>
+            </a:r>
+            <a:endParaRPr lang="en-US" dirty="0"/>
+          </a:p>
+        </p:txBody>
+      </p:sp>
+      <p:sp>
+        <p:nvSpPr>
+          <p:cNvPr id="3" name="Content Placeholder 2"/>
+          <p:cNvSpPr>
+            <a:spLocks noGrp="1"/>
+          </p:cNvSpPr>
+          <p:nvPr>
+            <p:ph idx="1"/>
+          </p:nvPr>
+        </p:nvSpPr>
+        <p:spPr/>
+        <p:txBody>
+          <a:bodyPr/>
+          <a:lstStyle/>
+          <a:p>
+            <a:r>
+              <a:rPr lang="en-US" sz="2000" dirty="0" smtClean="0"/>
+              <a:t>"Protocol Buffers." </a:t>
+            </a:r>
+            <a:r>
+              <a:rPr lang="en-US" sz="2000" i="1" dirty="0" smtClean="0"/>
+              <a:t>Google Developers</a:t>
+            </a:r>
+            <a:r>
+              <a:rPr lang="en-US" sz="2000" dirty="0" smtClean="0"/>
+              <a:t>. Google, </a:t>
+            </a:r>
+            <a:r>
+              <a:rPr lang="en-US" sz="2000" dirty="0" err="1" smtClean="0"/>
+              <a:t>n.d</a:t>
+            </a:r>
+            <a:r>
+              <a:rPr lang="en-US" sz="2000" dirty="0" smtClean="0"/>
+              <a:t>. Web. 23 Oct. 2012. &lt;https://developers.google.com/protocol-buffers/&gt;.</a:t>
+            </a:r>
+          </a:p>
+          <a:p>
+            <a:endParaRPr lang="en-US" dirty="0"/>
+          </a:p>
+        </p:txBody>
+      </p:sp>
+    </p:spTree>
+  </p:cSld>
+  <p:clrMapOvr>
+    <a:masterClrMapping/>
+  </p:clrMapOvr>
+</p:sld>
+</file>
+
+<file path=ppt/slides/slide13.xml><?xml version="1.0" encoding="utf-8"?>
 <p:sld xmlns:a="http://schemas.openxmlformats.org/drawingml/2006/main" xmlns:r="http://schemas.openxmlformats.org/officeDocument/2006/relationships" xmlns:p="http://schemas.openxmlformats.org/presentationml/2006/main">
   <p:cSld>
     <p:spTree>
@@ -4209,22 +4277,14 @@
             <a:pPr lvl="1"/>
             <a:r>
               <a:rPr lang="en-US" sz="2200" dirty="0" smtClean="0"/>
-              <a:t>What are Protocol Buffers</a:t>
-            </a:r>
+              <a:t>What are Protocol Buffers?</a:t>
+            </a:r>
+          </a:p>
+          <a:p>
+            <a:pPr lvl="1"/>
             <a:r>
               <a:rPr lang="en-US" sz="2200" dirty="0" smtClean="0"/>
-              <a:t>?</a:t>
-            </a:r>
-          </a:p>
-          <a:p>
-            <a:pPr lvl="1"/>
-            <a:r>
-              <a:rPr lang="en-US" sz="2200" dirty="0" smtClean="0"/>
-              <a:t>How to use Protocol </a:t>
-            </a:r>
-            <a:r>
-              <a:rPr lang="en-US" sz="2200" dirty="0" smtClean="0"/>
-              <a:t>Buffers</a:t>
+              <a:t>How to use Protocol Buffers</a:t>
             </a:r>
           </a:p>
           <a:p>
@@ -4243,22 +4303,14 @@
             <a:pPr lvl="1"/>
             <a:r>
               <a:rPr lang="en-US" sz="2200" dirty="0" smtClean="0"/>
-              <a:t>Problem </a:t>
-            </a:r>
+              <a:t>Problem Diagnosis</a:t>
+            </a:r>
+          </a:p>
+          <a:p>
+            <a:pPr lvl="1"/>
             <a:r>
               <a:rPr lang="en-US" sz="2200" dirty="0" smtClean="0"/>
-              <a:t>Diagnosis</a:t>
-            </a:r>
-          </a:p>
-          <a:p>
-            <a:pPr lvl="1"/>
-            <a:r>
-              <a:rPr lang="en-US" sz="2200" dirty="0" smtClean="0"/>
-              <a:t>Proposed </a:t>
-            </a:r>
-            <a:r>
-              <a:rPr lang="en-US" sz="2200" dirty="0" smtClean="0"/>
-              <a:t>Solution</a:t>
+              <a:t>Proposed Solution</a:t>
             </a:r>
           </a:p>
           <a:p>
@@ -4282,11 +4334,7 @@
             </a:r>
             <a:r>
               <a:rPr lang="en-US" sz="2200" dirty="0" smtClean="0"/>
-              <a:t> </a:t>
-            </a:r>
-            <a:r>
-              <a:rPr lang="en-US" sz="2200" dirty="0" smtClean="0"/>
-              <a:t>Design</a:t>
+              <a:t> Design</a:t>
             </a:r>
           </a:p>
           <a:p>
@@ -4416,22 +4464,14 @@
             <a:pPr lvl="1"/>
             <a:r>
               <a:rPr lang="en-US" sz="2600" dirty="0" smtClean="0"/>
-              <a:t>C</a:t>
-            </a:r>
+              <a:t>Created within Google Developers </a:t>
+            </a:r>
+          </a:p>
+          <a:p>
+            <a:pPr lvl="1"/>
             <a:r>
               <a:rPr lang="en-US" sz="2600" dirty="0" smtClean="0"/>
-              <a:t>reated within Google Developers </a:t>
-            </a:r>
-          </a:p>
-          <a:p>
-            <a:pPr lvl="1"/>
-            <a:r>
-              <a:rPr lang="en-US" sz="2600" dirty="0" smtClean="0"/>
-              <a:t>A</a:t>
-            </a:r>
-            <a:r>
-              <a:rPr lang="en-US" sz="2600" dirty="0" smtClean="0"/>
-              <a:t>  flexible, efficient, automatic mechanism for serializing structured data.  </a:t>
+              <a:t>A  flexible, efficient, automatic mechanism for serializing structured data.  </a:t>
             </a:r>
           </a:p>
           <a:p>
@@ -4447,7 +4487,6 @@
               <a:rPr lang="en-US" sz="1900" dirty="0" smtClean="0"/>
               <a:t>Smaller, simpler, faster, and generates easy to use data classes.</a:t>
             </a:r>
-            <a:endParaRPr lang="en-US" sz="1900" dirty="0" smtClean="0"/>
           </a:p>
           <a:p>
             <a:r>
@@ -4470,11 +4509,7 @@
             </a:r>
             <a:r>
               <a:rPr lang="en-US" sz="1900" dirty="0" smtClean="0"/>
-              <a:t>C</a:t>
-            </a:r>
-            <a:r>
-              <a:rPr lang="en-US" sz="1900" dirty="0" smtClean="0"/>
-              <a:t>ompiled with Java, C++ or Python</a:t>
+              <a:t>Compiled with Java, C++ or Python</a:t>
             </a:r>
           </a:p>
           <a:p>
@@ -4597,7 +4632,6 @@
               <a:rPr lang="en-US" sz="1600" dirty="0" smtClean="0"/>
               <a:t> in a .proto file:</a:t>
             </a:r>
-            <a:endParaRPr lang="en-US" sz="1600" dirty="0" smtClean="0"/>
           </a:p>
           <a:p>
             <a:pPr lvl="2">
@@ -4744,11 +4778,7 @@
             </a:r>
             <a:r>
               <a:rPr lang="en-US" sz="1000" b="1" dirty="0" smtClean="0"/>
-              <a:t> phone = 4;  </a:t>
-            </a:r>
-            <a:r>
-              <a:rPr lang="en-US" sz="1000" b="1" dirty="0" smtClean="0"/>
-              <a:t>}</a:t>
+              <a:t> phone = 4;  }</a:t>
             </a:r>
           </a:p>
           <a:p>
@@ -4811,11 +4841,7 @@
             </a:r>
             <a:r>
               <a:rPr lang="en-US" sz="1000" b="1" dirty="0" smtClean="0"/>
-              <a:t>(1234</a:t>
-            </a:r>
-            <a:r>
-              <a:rPr lang="en-US" sz="1000" b="1" dirty="0" smtClean="0"/>
-              <a:t>); </a:t>
+              <a:t>(1234); </a:t>
             </a:r>
             <a:br>
               <a:rPr lang="en-US" sz="1000" b="1" dirty="0" smtClean="0"/>
@@ -4845,11 +4871,7 @@
             </a:r>
             <a:r>
               <a:rPr lang="en-US" sz="1000" b="1" dirty="0" smtClean="0"/>
-              <a:t> </a:t>
-            </a:r>
-            <a:r>
-              <a:rPr lang="en-US" sz="1000" b="1" dirty="0" smtClean="0"/>
-              <a:t>output("</a:t>
+              <a:t> output("</a:t>
             </a:r>
             <a:r>
               <a:rPr lang="en-US" sz="1000" b="1" dirty="0" err="1" smtClean="0"/>
@@ -4888,11 +4910,7 @@
             </a:r>
             <a:r>
               <a:rPr lang="en-US" sz="1000" b="1" dirty="0" smtClean="0"/>
-              <a:t>(&amp;output</a:t>
-            </a:r>
-            <a:r>
-              <a:rPr lang="en-US" sz="1000" b="1" dirty="0" smtClean="0"/>
-              <a:t>);</a:t>
+              <a:t>(&amp;output);</a:t>
             </a:r>
           </a:p>
           <a:p>
@@ -4906,7 +4924,6 @@
               <a:rPr lang="en-US" sz="1600" dirty="0" smtClean="0"/>
               <a:t>You can also extend your protocol without breaking the code and keeping backwards-compatibility: You could add new fields to the message formats since the old binaries will ignore the new fields.</a:t>
             </a:r>
-            <a:endParaRPr lang="en-US" sz="1600" dirty="0" smtClean="0"/>
           </a:p>
           <a:p>
             <a:pPr lvl="1">
@@ -4990,11 +5007,7 @@
             <a:pPr lvl="1"/>
             <a:r>
               <a:rPr lang="en-US" dirty="0" smtClean="0"/>
-              <a:t>No way to creat</a:t>
-            </a:r>
-            <a:r>
-              <a:rPr lang="en-US" dirty="0" smtClean="0"/>
-              <a:t>e messages “on the fly”</a:t>
+              <a:t>No way to edit messages “on the fly”</a:t>
             </a:r>
           </a:p>
           <a:p>
@@ -5028,7 +5041,15 @@
             <a:pPr lvl="1"/>
             <a:r>
               <a:rPr lang="en-US" dirty="0" smtClean="0"/>
-              <a:t>Analysts don’t have access to tools that create or change proto messages to fit their needs</a:t>
+              <a:t>Analysts don’t have access to tools </a:t>
+            </a:r>
+            <a:r>
+              <a:rPr lang="en-US" smtClean="0"/>
+              <a:t>that change </a:t>
+            </a:r>
+            <a:r>
+              <a:rPr lang="en-US" dirty="0" smtClean="0"/>
+              <a:t>proto messages to fit their needs</a:t>
             </a:r>
           </a:p>
           <a:p>
@@ -5133,11 +5154,7 @@
             </a:r>
             <a:r>
               <a:rPr lang="en-US" dirty="0" smtClean="0"/>
-              <a:t> </a:t>
-            </a:r>
-            <a:r>
-              <a:rPr lang="en-US" dirty="0" smtClean="0"/>
-              <a:t>Features:</a:t>
+              <a:t> Features:</a:t>
             </a:r>
           </a:p>
           <a:p>
@@ -5166,7 +5183,7 @@
             <a:pPr lvl="1"/>
             <a:r>
               <a:rPr lang="en-US" dirty="0" smtClean="0"/>
-              <a:t>Two forms of the system: Java and C++</a:t>
+              <a:t>Java based GUI system</a:t>
             </a:r>
           </a:p>
           <a:p>

</xml_diff>

<commit_message>
Added Remove into UML and Presentation
</commit_message>
<xml_diff>
--- a/Documents/ProtoDebuggerPresentation.pptx
+++ b/Documents/ProtoDebuggerPresentation.pptx
@@ -16,13 +16,14 @@
     <p:sldId id="272" r:id="rId10"/>
     <p:sldId id="273" r:id="rId11"/>
     <p:sldId id="274" r:id="rId12"/>
-    <p:sldId id="262" r:id="rId13"/>
-    <p:sldId id="270" r:id="rId14"/>
-    <p:sldId id="271" r:id="rId15"/>
-    <p:sldId id="264" r:id="rId16"/>
-    <p:sldId id="269" r:id="rId17"/>
-    <p:sldId id="267" r:id="rId18"/>
-    <p:sldId id="263" r:id="rId19"/>
+    <p:sldId id="275" r:id="rId13"/>
+    <p:sldId id="262" r:id="rId14"/>
+    <p:sldId id="270" r:id="rId15"/>
+    <p:sldId id="271" r:id="rId16"/>
+    <p:sldId id="264" r:id="rId17"/>
+    <p:sldId id="269" r:id="rId18"/>
+    <p:sldId id="267" r:id="rId19"/>
+    <p:sldId id="263" r:id="rId20"/>
   </p:sldIdLst>
   <p:sldSz cx="9144000" cy="6858000" type="screen4x3"/>
   <p:notesSz cx="6858000" cy="9144000"/>
@@ -4068,6 +4069,38 @@
           </a:p>
         </p:txBody>
       </p:sp>
+      <p:pic>
+        <p:nvPicPr>
+          <p:cNvPr id="1026" name="Picture 2"/>
+          <p:cNvPicPr>
+            <a:picLocks noChangeAspect="1" noChangeArrowheads="1"/>
+          </p:cNvPicPr>
+          <p:nvPr/>
+        </p:nvPicPr>
+        <p:blipFill>
+          <a:blip r:embed="rId2" cstate="print"/>
+          <a:srcRect/>
+          <a:stretch>
+            <a:fillRect/>
+          </a:stretch>
+        </p:blipFill>
+        <p:spPr bwMode="auto">
+          <a:xfrm>
+            <a:off x="152400" y="1600200"/>
+            <a:ext cx="8853854" cy="4038600"/>
+          </a:xfrm>
+          <a:prstGeom prst="rect">
+            <a:avLst/>
+          </a:prstGeom>
+          <a:noFill/>
+          <a:ln w="9525">
+            <a:noFill/>
+            <a:miter lim="800000"/>
+            <a:headEnd/>
+            <a:tailEnd/>
+          </a:ln>
+        </p:spPr>
+      </p:pic>
     </p:spTree>
   </p:cSld>
   <p:clrMapOvr>
@@ -4105,6 +4138,90 @@
         </p:nvSpPr>
         <p:spPr/>
         <p:txBody>
+          <a:bodyPr/>
+          <a:lstStyle/>
+          <a:p>
+            <a:r>
+              <a:rPr lang="en-US" dirty="0" err="1" smtClean="0"/>
+              <a:t>ProtoDebugger</a:t>
+            </a:r>
+            <a:r>
+              <a:rPr lang="en-US" dirty="0" smtClean="0"/>
+              <a:t> Design</a:t>
+            </a:r>
+            <a:endParaRPr lang="en-US" dirty="0"/>
+          </a:p>
+        </p:txBody>
+      </p:sp>
+      <p:pic>
+        <p:nvPicPr>
+          <p:cNvPr id="2050" name="Picture 2"/>
+          <p:cNvPicPr>
+            <a:picLocks noChangeAspect="1" noChangeArrowheads="1"/>
+          </p:cNvPicPr>
+          <p:nvPr/>
+        </p:nvPicPr>
+        <p:blipFill>
+          <a:blip r:embed="rId2" cstate="print"/>
+          <a:srcRect/>
+          <a:stretch>
+            <a:fillRect/>
+          </a:stretch>
+        </p:blipFill>
+        <p:spPr bwMode="auto">
+          <a:xfrm>
+            <a:off x="152400" y="1828800"/>
+            <a:ext cx="8839200" cy="3581400"/>
+          </a:xfrm>
+          <a:prstGeom prst="rect">
+            <a:avLst/>
+          </a:prstGeom>
+          <a:noFill/>
+          <a:ln w="9525">
+            <a:noFill/>
+            <a:miter lim="800000"/>
+            <a:headEnd/>
+            <a:tailEnd/>
+          </a:ln>
+        </p:spPr>
+      </p:pic>
+    </p:spTree>
+  </p:cSld>
+  <p:clrMapOvr>
+    <a:masterClrMapping/>
+  </p:clrMapOvr>
+</p:sld>
+</file>
+
+<file path=ppt/slides/slide13.xml><?xml version="1.0" encoding="utf-8"?>
+<p:sld xmlns:a="http://schemas.openxmlformats.org/drawingml/2006/main" xmlns:r="http://schemas.openxmlformats.org/officeDocument/2006/relationships" xmlns:p="http://schemas.openxmlformats.org/presentationml/2006/main">
+  <p:cSld>
+    <p:spTree>
+      <p:nvGrpSpPr>
+        <p:cNvPr id="1" name=""/>
+        <p:cNvGrpSpPr/>
+        <p:nvPr/>
+      </p:nvGrpSpPr>
+      <p:grpSpPr>
+        <a:xfrm>
+          <a:off x="0" y="0"/>
+          <a:ext cx="0" cy="0"/>
+          <a:chOff x="0" y="0"/>
+          <a:chExt cx="0" cy="0"/>
+        </a:xfrm>
+      </p:grpSpPr>
+      <p:sp>
+        <p:nvSpPr>
+          <p:cNvPr id="2" name="Title 1"/>
+          <p:cNvSpPr>
+            <a:spLocks noGrp="1"/>
+          </p:cNvSpPr>
+          <p:nvPr>
+            <p:ph type="title"/>
+          </p:nvPr>
+        </p:nvSpPr>
+        <p:spPr/>
+        <p:txBody>
           <a:bodyPr>
             <a:normAutofit fontScale="90000"/>
           </a:bodyPr>
@@ -4116,11 +4233,7 @@
             </a:r>
             <a:r>
               <a:rPr lang="en-US" dirty="0" smtClean="0"/>
-              <a:t> </a:t>
-            </a:r>
-            <a:r>
-              <a:rPr lang="en-US" dirty="0" smtClean="0"/>
-              <a:t>GUI: </a:t>
+              <a:t> GUI: </a:t>
             </a:r>
             <a:r>
               <a:rPr lang="en-US" dirty="0" err="1" smtClean="0"/>
@@ -4170,7 +4283,7 @@
 </p:sld>
 </file>
 
-<file path=ppt/slides/slide13.xml><?xml version="1.0" encoding="utf-8"?>
+<file path=ppt/slides/slide14.xml><?xml version="1.0" encoding="utf-8"?>
 <p:sld xmlns:a="http://schemas.openxmlformats.org/drawingml/2006/main" xmlns:r="http://schemas.openxmlformats.org/officeDocument/2006/relationships" xmlns:p="http://schemas.openxmlformats.org/presentationml/2006/main">
   <p:cSld>
     <p:spTree>
@@ -4292,7 +4405,7 @@
 </p:sld>
 </file>
 
-<file path=ppt/slides/slide14.xml><?xml version="1.0" encoding="utf-8"?>
+<file path=ppt/slides/slide15.xml><?xml version="1.0" encoding="utf-8"?>
 <p:sld xmlns:a="http://schemas.openxmlformats.org/drawingml/2006/main" xmlns:r="http://schemas.openxmlformats.org/officeDocument/2006/relationships" xmlns:p="http://schemas.openxmlformats.org/presentationml/2006/main">
   <p:cSld>
     <p:spTree>
@@ -4382,54 +4495,6 @@
 </p:sld>
 </file>
 
-<file path=ppt/slides/slide15.xml><?xml version="1.0" encoding="utf-8"?>
-<p:sld xmlns:a="http://schemas.openxmlformats.org/drawingml/2006/main" xmlns:r="http://schemas.openxmlformats.org/officeDocument/2006/relationships" xmlns:p="http://schemas.openxmlformats.org/presentationml/2006/main">
-  <p:cSld>
-    <p:spTree>
-      <p:nvGrpSpPr>
-        <p:cNvPr id="1" name=""/>
-        <p:cNvGrpSpPr/>
-        <p:nvPr/>
-      </p:nvGrpSpPr>
-      <p:grpSpPr>
-        <a:xfrm>
-          <a:off x="0" y="0"/>
-          <a:ext cx="0" cy="0"/>
-          <a:chOff x="0" y="0"/>
-          <a:chExt cx="0" cy="0"/>
-        </a:xfrm>
-      </p:grpSpPr>
-      <p:sp>
-        <p:nvSpPr>
-          <p:cNvPr id="2" name="Title 1"/>
-          <p:cNvSpPr>
-            <a:spLocks noGrp="1"/>
-          </p:cNvSpPr>
-          <p:nvPr>
-            <p:ph type="title"/>
-          </p:nvPr>
-        </p:nvSpPr>
-        <p:spPr/>
-        <p:txBody>
-          <a:bodyPr/>
-          <a:lstStyle/>
-          <a:p>
-            <a:r>
-              <a:rPr lang="en-US" dirty="0" smtClean="0"/>
-              <a:t>Demonstration</a:t>
-            </a:r>
-            <a:endParaRPr lang="en-US" dirty="0"/>
-          </a:p>
-        </p:txBody>
-      </p:sp>
-    </p:spTree>
-  </p:cSld>
-  <p:clrMapOvr>
-    <a:masterClrMapping/>
-  </p:clrMapOvr>
-</p:sld>
-</file>
-
 <file path=ppt/slides/slide16.xml><?xml version="1.0" encoding="utf-8"?>
 <p:sld xmlns:a="http://schemas.openxmlformats.org/drawingml/2006/main" xmlns:r="http://schemas.openxmlformats.org/officeDocument/2006/relationships" xmlns:p="http://schemas.openxmlformats.org/presentationml/2006/main">
   <p:cSld>
@@ -4464,28 +4529,9 @@
           <a:p>
             <a:r>
               <a:rPr lang="en-US" dirty="0" smtClean="0"/>
-              <a:t>Lessons Learned</a:t>
+              <a:t>Demonstration</a:t>
             </a:r>
             <a:endParaRPr lang="en-US" dirty="0"/>
-          </a:p>
-        </p:txBody>
-      </p:sp>
-      <p:sp>
-        <p:nvSpPr>
-          <p:cNvPr id="3" name="Content Placeholder 2"/>
-          <p:cNvSpPr>
-            <a:spLocks noGrp="1"/>
-          </p:cNvSpPr>
-          <p:nvPr>
-            <p:ph idx="1"/>
-          </p:nvPr>
-        </p:nvSpPr>
-        <p:spPr/>
-        <p:txBody>
-          <a:bodyPr/>
-          <a:lstStyle/>
-          <a:p>
-            <a:endParaRPr lang="en-US"/>
           </a:p>
         </p:txBody>
       </p:sp>
@@ -4531,7 +4577,7 @@
           <a:p>
             <a:r>
               <a:rPr lang="en-US" dirty="0" smtClean="0"/>
-              <a:t>References</a:t>
+              <a:t>Lessons Learned</a:t>
             </a:r>
             <a:endParaRPr lang="en-US" dirty="0"/>
           </a:p>
@@ -4552,29 +4598,7 @@
           <a:bodyPr/>
           <a:lstStyle/>
           <a:p>
-            <a:r>
-              <a:rPr lang="en-US" sz="2000" dirty="0" smtClean="0"/>
-              <a:t>"Protocol Buffers." </a:t>
-            </a:r>
-            <a:r>
-              <a:rPr lang="en-US" sz="2000" i="1" dirty="0" smtClean="0"/>
-              <a:t>Google Developers</a:t>
-            </a:r>
-            <a:r>
-              <a:rPr lang="en-US" sz="2000" dirty="0" smtClean="0"/>
-              <a:t>. Google, </a:t>
-            </a:r>
-            <a:r>
-              <a:rPr lang="en-US" sz="2000" dirty="0" err="1" smtClean="0"/>
-              <a:t>n.d</a:t>
-            </a:r>
-            <a:r>
-              <a:rPr lang="en-US" sz="2000" dirty="0" smtClean="0"/>
-              <a:t>. Web. 23 Oct. 2012. &lt;https://developers.google.com/protocol-buffers/&gt;.</a:t>
-            </a:r>
-          </a:p>
-          <a:p>
-            <a:endParaRPr lang="en-US" dirty="0"/>
+            <a:endParaRPr lang="en-US"/>
           </a:p>
         </p:txBody>
       </p:sp>
@@ -4587,6 +4611,95 @@
 </file>
 
 <file path=ppt/slides/slide18.xml><?xml version="1.0" encoding="utf-8"?>
+<p:sld xmlns:a="http://schemas.openxmlformats.org/drawingml/2006/main" xmlns:r="http://schemas.openxmlformats.org/officeDocument/2006/relationships" xmlns:p="http://schemas.openxmlformats.org/presentationml/2006/main">
+  <p:cSld>
+    <p:spTree>
+      <p:nvGrpSpPr>
+        <p:cNvPr id="1" name=""/>
+        <p:cNvGrpSpPr/>
+        <p:nvPr/>
+      </p:nvGrpSpPr>
+      <p:grpSpPr>
+        <a:xfrm>
+          <a:off x="0" y="0"/>
+          <a:ext cx="0" cy="0"/>
+          <a:chOff x="0" y="0"/>
+          <a:chExt cx="0" cy="0"/>
+        </a:xfrm>
+      </p:grpSpPr>
+      <p:sp>
+        <p:nvSpPr>
+          <p:cNvPr id="2" name="Title 1"/>
+          <p:cNvSpPr>
+            <a:spLocks noGrp="1"/>
+          </p:cNvSpPr>
+          <p:nvPr>
+            <p:ph type="title"/>
+          </p:nvPr>
+        </p:nvSpPr>
+        <p:spPr/>
+        <p:txBody>
+          <a:bodyPr/>
+          <a:lstStyle/>
+          <a:p>
+            <a:r>
+              <a:rPr lang="en-US" dirty="0" smtClean="0"/>
+              <a:t>References</a:t>
+            </a:r>
+            <a:endParaRPr lang="en-US" dirty="0"/>
+          </a:p>
+        </p:txBody>
+      </p:sp>
+      <p:sp>
+        <p:nvSpPr>
+          <p:cNvPr id="3" name="Content Placeholder 2"/>
+          <p:cNvSpPr>
+            <a:spLocks noGrp="1"/>
+          </p:cNvSpPr>
+          <p:nvPr>
+            <p:ph idx="1"/>
+          </p:nvPr>
+        </p:nvSpPr>
+        <p:spPr/>
+        <p:txBody>
+          <a:bodyPr/>
+          <a:lstStyle/>
+          <a:p>
+            <a:r>
+              <a:rPr lang="en-US" sz="2000" dirty="0" smtClean="0"/>
+              <a:t>"Protocol Buffers." </a:t>
+            </a:r>
+            <a:r>
+              <a:rPr lang="en-US" sz="2000" i="1" dirty="0" smtClean="0"/>
+              <a:t>Google Developers</a:t>
+            </a:r>
+            <a:r>
+              <a:rPr lang="en-US" sz="2000" dirty="0" smtClean="0"/>
+              <a:t>. Google, </a:t>
+            </a:r>
+            <a:r>
+              <a:rPr lang="en-US" sz="2000" dirty="0" err="1" smtClean="0"/>
+              <a:t>n.d</a:t>
+            </a:r>
+            <a:r>
+              <a:rPr lang="en-US" sz="2000" dirty="0" smtClean="0"/>
+              <a:t>. Web. 23 Oct. 2012. &lt;https://developers.google.com/protocol-buffers/&gt;.</a:t>
+            </a:r>
+          </a:p>
+          <a:p>
+            <a:endParaRPr lang="en-US" dirty="0"/>
+          </a:p>
+        </p:txBody>
+      </p:sp>
+    </p:spTree>
+  </p:cSld>
+  <p:clrMapOvr>
+    <a:masterClrMapping/>
+  </p:clrMapOvr>
+</p:sld>
+</file>
+
+<file path=ppt/slides/slide19.xml><?xml version="1.0" encoding="utf-8"?>
 <p:sld xmlns:a="http://schemas.openxmlformats.org/drawingml/2006/main" xmlns:r="http://schemas.openxmlformats.org/officeDocument/2006/relationships" xmlns:p="http://schemas.openxmlformats.org/presentationml/2006/main">
   <p:cSld>
     <p:spTree>

</xml_diff>